<commit_message>
inclusao tcc versao conferencia e apresentacao fim
</commit_message>
<xml_diff>
--- a/202102/ppi2/pmc_joao_paulo.pptx
+++ b/202102/ppi2/pmc_joao_paulo.pptx
@@ -350,7 +350,7 @@
               <a:pPr>
                 <a:defRPr/>
               </a:pPr>
-              <a:t>11/17/2021</a:t>
+              <a:t>11/19/2021</a:t>
             </a:fld>
             <a:endParaRPr lang="en-US" dirty="0"/>
           </a:p>
@@ -5081,10 +5081,10 @@
         </p:nvGrpSpPr>
         <p:grpSpPr bwMode="auto">
           <a:xfrm>
-            <a:off x="5725890" y="1113068"/>
-            <a:ext cx="1376585" cy="1141607"/>
+            <a:off x="5644051" y="1304210"/>
+            <a:ext cx="1447654" cy="1253785"/>
             <a:chOff x="179335" y="350308"/>
-            <a:chExt cx="1377757" cy="1140664"/>
+            <a:chExt cx="1448887" cy="1252749"/>
           </a:xfrm>
         </p:grpSpPr>
         <p:pic>
@@ -5111,7 +5111,7 @@
           <p:spPr bwMode="auto">
             <a:xfrm>
               <a:off x="179335" y="350308"/>
-              <a:ext cx="1319252" cy="1140664"/>
+              <a:ext cx="1448887" cy="1252749"/>
             </a:xfrm>
             <a:prstGeom prst="rect">
               <a:avLst/>
@@ -5781,7 +5781,7 @@
           <p:spPr>
             <a:xfrm>
               <a:off x="343105" y="817621"/>
-              <a:ext cx="1311461" cy="1007135"/>
+              <a:ext cx="1311461" cy="954855"/>
             </a:xfrm>
             <a:prstGeom prst="rect">
               <a:avLst/>
@@ -5800,7 +5800,7 @@
                 <a:defRPr/>
               </a:pPr>
               <a:r>
-                <a:rPr lang="pt-BR" sz="1000" dirty="0" smtClean="0">
+                <a:rPr lang="pt-BR" sz="1100" dirty="0" smtClean="0">
                   <a:solidFill>
                     <a:schemeClr val="tx1">
                       <a:lumMod val="65000"/>
@@ -5810,9 +5810,9 @@
                   <a:latin typeface="Arial"/>
                   <a:cs typeface="Arial"/>
                 </a:rPr>
-                <a:t>Sistemas de detecção de fraudes tradicionais não conseguem verificar altos volumes dados automaticamente</a:t>
+                <a:t>Sistema de AM possuem desenvolvimento complexo desde o modelo até sua implementação</a:t>
               </a:r>
-              <a:endParaRPr lang="pt-BR" sz="1000" dirty="0">
+              <a:endParaRPr lang="pt-BR" sz="1100" dirty="0">
                 <a:solidFill>
                   <a:schemeClr val="tx1">
                     <a:lumMod val="65000"/>
@@ -6871,7 +6871,7 @@
         <p:spPr bwMode="auto">
           <a:xfrm>
             <a:off x="4125690" y="1899251"/>
-            <a:ext cx="1258888" cy="563231"/>
+            <a:ext cx="1258888" cy="877163"/>
           </a:xfrm>
           <a:prstGeom prst="rect">
             <a:avLst/>
@@ -6900,8 +6900,16 @@
                 <a:latin typeface="Trebuchet MS" pitchFamily="34" charset="0"/>
                 <a:cs typeface="Arial" charset="0"/>
               </a:rPr>
-              <a:t>Outros compromissos diversos</a:t>
+              <a:t>Investidores</a:t>
             </a:r>
+          </a:p>
+          <a:p>
+            <a:pPr eaLnBrk="1" hangingPunct="1">
+              <a:lnSpc>
+                <a:spcPct val="85000"/>
+              </a:lnSpc>
+              <a:defRPr/>
+            </a:pPr>
             <a:endParaRPr lang="pt-BR" sz="1200" dirty="0">
               <a:solidFill>
                 <a:schemeClr val="tx1">
@@ -6913,82 +6921,6 @@
               <a:cs typeface="Arial" charset="0"/>
             </a:endParaRPr>
           </a:p>
-        </p:txBody>
-      </p:sp>
-      <p:pic>
-        <p:nvPicPr>
-          <p:cNvPr id="179" name="Picture 2"/>
-          <p:cNvPicPr>
-            <a:picLocks noChangeAspect="1" noChangeArrowheads="1"/>
-          </p:cNvPicPr>
-          <p:nvPr/>
-        </p:nvPicPr>
-        <p:blipFill>
-          <a:blip r:embed="rId11" cstate="print">
-            <a:extLst>
-              <a:ext uri="{28A0092B-C50C-407E-A947-70E740481C1C}">
-                <a14:useLocalDpi xmlns:a14="http://schemas.microsoft.com/office/drawing/2010/main" val="0"/>
-              </a:ext>
-            </a:extLst>
-          </a:blip>
-          <a:srcRect/>
-          <a:stretch>
-            <a:fillRect/>
-          </a:stretch>
-        </p:blipFill>
-        <p:spPr bwMode="auto">
-          <a:xfrm>
-            <a:off x="5696945" y="1910946"/>
-            <a:ext cx="1256764" cy="1088460"/>
-          </a:xfrm>
-          <a:prstGeom prst="rect">
-            <a:avLst/>
-          </a:prstGeom>
-          <a:noFill/>
-          <a:ln>
-            <a:noFill/>
-          </a:ln>
-          <a:extLst>
-            <a:ext uri="{909E8E84-426E-40DD-AFC4-6F175D3DCCD1}">
-              <a14:hiddenFill xmlns:a14="http://schemas.microsoft.com/office/drawing/2010/main">
-                <a:solidFill>
-                  <a:srgbClr val="FFFFFF"/>
-                </a:solidFill>
-              </a14:hiddenFill>
-            </a:ext>
-            <a:ext uri="{91240B29-F687-4F45-9708-019B960494DF}">
-              <a14:hiddenLine xmlns:a14="http://schemas.microsoft.com/office/drawing/2010/main" w="9525">
-                <a:solidFill>
-                  <a:srgbClr val="000000"/>
-                </a:solidFill>
-                <a:miter lim="800000"/>
-                <a:headEnd/>
-                <a:tailEnd/>
-              </a14:hiddenLine>
-            </a:ext>
-          </a:extLst>
-        </p:spPr>
-      </p:pic>
-      <p:sp>
-        <p:nvSpPr>
-          <p:cNvPr id="180" name="Retângulo 179"/>
-          <p:cNvSpPr/>
-          <p:nvPr/>
-        </p:nvSpPr>
-        <p:spPr bwMode="auto">
-          <a:xfrm>
-            <a:off x="5790608" y="2035969"/>
-            <a:ext cx="1277898" cy="523990"/>
-          </a:xfrm>
-          <a:prstGeom prst="rect">
-            <a:avLst/>
-          </a:prstGeom>
-        </p:spPr>
-        <p:txBody>
-          <a:bodyPr wrap="square">
-            <a:spAutoFit/>
-          </a:bodyPr>
-          <a:lstStyle/>
           <a:p>
             <a:pPr eaLnBrk="1" hangingPunct="1">
               <a:lnSpc>
@@ -6997,27 +6929,27 @@
               <a:defRPr/>
             </a:pPr>
             <a:r>
-              <a:rPr lang="pt-BR" sz="1100" dirty="0" smtClean="0">
+              <a:rPr lang="pt-BR" sz="1200" dirty="0" smtClean="0">
                 <a:solidFill>
                   <a:schemeClr val="tx1">
                     <a:lumMod val="65000"/>
                     <a:lumOff val="35000"/>
                   </a:schemeClr>
                 </a:solidFill>
-                <a:latin typeface="Arial"/>
-                <a:cs typeface="Arial"/>
+                <a:latin typeface="Trebuchet MS" pitchFamily="34" charset="0"/>
+                <a:cs typeface="Arial" charset="0"/>
               </a:rPr>
-              <a:t>Terei tempo suficiente para executar</a:t>
+              <a:t>Ou Pesquisadores de AM</a:t>
             </a:r>
-            <a:endParaRPr lang="pt-BR" sz="1100" dirty="0">
+            <a:endParaRPr lang="pt-BR" sz="1200" dirty="0">
               <a:solidFill>
                 <a:schemeClr val="tx1">
                   <a:lumMod val="65000"/>
                   <a:lumOff val="35000"/>
                 </a:schemeClr>
               </a:solidFill>
-              <a:latin typeface="Arial"/>
-              <a:cs typeface="Arial"/>
+              <a:latin typeface="Trebuchet MS" pitchFamily="34" charset="0"/>
+              <a:cs typeface="Arial" charset="0"/>
             </a:endParaRPr>
           </a:p>
         </p:txBody>

</xml_diff>